<commit_message>
got the presentation in a good place please fill out the solution and challenges faced
</commit_message>
<xml_diff>
--- a/Presentation.pptx
+++ b/Presentation.pptx
@@ -6,15 +6,16 @@
   </p:sldMasterIdLst>
   <p:sldIdLst>
     <p:sldId id="256" r:id="rId2"/>
-    <p:sldId id="257" r:id="rId3"/>
-    <p:sldId id="258" r:id="rId4"/>
-    <p:sldId id="259" r:id="rId5"/>
-    <p:sldId id="260" r:id="rId6"/>
-    <p:sldId id="261" r:id="rId7"/>
-    <p:sldId id="262" r:id="rId8"/>
-    <p:sldId id="263" r:id="rId9"/>
-    <p:sldId id="264" r:id="rId10"/>
-    <p:sldId id="266" r:id="rId11"/>
+    <p:sldId id="267" r:id="rId3"/>
+    <p:sldId id="257" r:id="rId4"/>
+    <p:sldId id="263" r:id="rId5"/>
+    <p:sldId id="258" r:id="rId6"/>
+    <p:sldId id="259" r:id="rId7"/>
+    <p:sldId id="260" r:id="rId8"/>
+    <p:sldId id="261" r:id="rId9"/>
+    <p:sldId id="262" r:id="rId10"/>
+    <p:sldId id="264" r:id="rId11"/>
+    <p:sldId id="266" r:id="rId12"/>
   </p:sldIdLst>
   <p:sldSz cx="12192000" cy="6858000"/>
   <p:notesSz cx="6858000" cy="9144000"/>
@@ -351,7 +352,7 @@
             <a:fld id="{B61BEF0D-F0BB-DE4B-95CE-6DB70DBA9567}" type="datetimeFigureOut">
               <a:rPr lang="en-US" dirty="0"/>
               <a:pPr/>
-              <a:t>11/29/2021</a:t>
+              <a:t>11/30/2021</a:t>
             </a:fld>
             <a:endParaRPr lang="en-US" dirty="0"/>
           </a:p>
@@ -682,7 +683,7 @@
             <a:fld id="{B61BEF0D-F0BB-DE4B-95CE-6DB70DBA9567}" type="datetimeFigureOut">
               <a:rPr lang="en-US" dirty="0"/>
               <a:pPr/>
-              <a:t>11/29/2021</a:t>
+              <a:t>11/30/2021</a:t>
             </a:fld>
             <a:endParaRPr lang="en-US" dirty="0"/>
           </a:p>
@@ -957,7 +958,7 @@
             <a:fld id="{B61BEF0D-F0BB-DE4B-95CE-6DB70DBA9567}" type="datetimeFigureOut">
               <a:rPr lang="en-US" dirty="0"/>
               <a:pPr/>
-              <a:t>11/29/2021</a:t>
+              <a:t>11/30/2021</a:t>
             </a:fld>
             <a:endParaRPr lang="en-US" dirty="0"/>
           </a:p>
@@ -1522,7 +1523,7 @@
             <a:fld id="{B61BEF0D-F0BB-DE4B-95CE-6DB70DBA9567}" type="datetimeFigureOut">
               <a:rPr lang="en-US" dirty="0"/>
               <a:pPr/>
-              <a:t>11/29/2021</a:t>
+              <a:t>11/30/2021</a:t>
             </a:fld>
             <a:endParaRPr lang="en-US" dirty="0"/>
           </a:p>
@@ -1797,7 +1798,7 @@
             <a:fld id="{B61BEF0D-F0BB-DE4B-95CE-6DB70DBA9567}" type="datetimeFigureOut">
               <a:rPr lang="en-US" dirty="0"/>
               <a:pPr/>
-              <a:t>11/29/2021</a:t>
+              <a:t>11/30/2021</a:t>
             </a:fld>
             <a:endParaRPr lang="en-US" dirty="0"/>
           </a:p>
@@ -2356,7 +2357,7 @@
             <a:fld id="{B61BEF0D-F0BB-DE4B-95CE-6DB70DBA9567}" type="datetimeFigureOut">
               <a:rPr lang="en-US" dirty="0"/>
               <a:pPr/>
-              <a:t>11/29/2021</a:t>
+              <a:t>11/30/2021</a:t>
             </a:fld>
             <a:endParaRPr lang="en-US" dirty="0"/>
           </a:p>
@@ -2680,7 +2681,7 @@
             <a:fld id="{B61BEF0D-F0BB-DE4B-95CE-6DB70DBA9567}" type="datetimeFigureOut">
               <a:rPr lang="en-US" dirty="0"/>
               <a:pPr/>
-              <a:t>11/29/2021</a:t>
+              <a:t>11/30/2021</a:t>
             </a:fld>
             <a:endParaRPr lang="en-US" dirty="0"/>
           </a:p>
@@ -2854,7 +2855,7 @@
             <a:fld id="{B61BEF0D-F0BB-DE4B-95CE-6DB70DBA9567}" type="datetimeFigureOut">
               <a:rPr lang="en-US" dirty="0"/>
               <a:pPr/>
-              <a:t>11/29/2021</a:t>
+              <a:t>11/30/2021</a:t>
             </a:fld>
             <a:endParaRPr lang="en-US" dirty="0"/>
           </a:p>
@@ -3089,7 +3090,7 @@
             <a:fld id="{B61BEF0D-F0BB-DE4B-95CE-6DB70DBA9567}" type="datetimeFigureOut">
               <a:rPr lang="en-US" dirty="0"/>
               <a:pPr/>
-              <a:t>11/29/2021</a:t>
+              <a:t>11/30/2021</a:t>
             </a:fld>
             <a:endParaRPr lang="en-US" dirty="0"/>
           </a:p>
@@ -3286,7 +3287,7 @@
             <a:fld id="{B61BEF0D-F0BB-DE4B-95CE-6DB70DBA9567}" type="datetimeFigureOut">
               <a:rPr lang="en-US" dirty="0"/>
               <a:pPr/>
-              <a:t>11/29/2021</a:t>
+              <a:t>11/30/2021</a:t>
             </a:fld>
             <a:endParaRPr lang="en-US" dirty="0"/>
           </a:p>
@@ -3559,7 +3560,7 @@
             <a:fld id="{B61BEF0D-F0BB-DE4B-95CE-6DB70DBA9567}" type="datetimeFigureOut">
               <a:rPr lang="en-US" dirty="0"/>
               <a:pPr/>
-              <a:t>11/29/2021</a:t>
+              <a:t>11/30/2021</a:t>
             </a:fld>
             <a:endParaRPr lang="en-US" dirty="0"/>
           </a:p>
@@ -3822,7 +3823,7 @@
             <a:fld id="{B61BEF0D-F0BB-DE4B-95CE-6DB70DBA9567}" type="datetimeFigureOut">
               <a:rPr lang="en-US" dirty="0"/>
               <a:pPr/>
-              <a:t>11/29/2021</a:t>
+              <a:t>11/30/2021</a:t>
             </a:fld>
             <a:endParaRPr lang="en-US" dirty="0"/>
           </a:p>
@@ -4193,7 +4194,7 @@
             <a:fld id="{B61BEF0D-F0BB-DE4B-95CE-6DB70DBA9567}" type="datetimeFigureOut">
               <a:rPr lang="en-US" dirty="0"/>
               <a:pPr/>
-              <a:t>11/29/2021</a:t>
+              <a:t>11/30/2021</a:t>
             </a:fld>
             <a:endParaRPr lang="en-US" dirty="0"/>
           </a:p>
@@ -4338,7 +4339,7 @@
             <a:fld id="{B61BEF0D-F0BB-DE4B-95CE-6DB70DBA9567}" type="datetimeFigureOut">
               <a:rPr lang="en-US" dirty="0"/>
               <a:pPr/>
-              <a:t>11/29/2021</a:t>
+              <a:t>11/30/2021</a:t>
             </a:fld>
             <a:endParaRPr lang="en-US" dirty="0"/>
           </a:p>
@@ -4460,7 +4461,7 @@
             <a:fld id="{B61BEF0D-F0BB-DE4B-95CE-6DB70DBA9567}" type="datetimeFigureOut">
               <a:rPr lang="en-US" dirty="0"/>
               <a:pPr/>
-              <a:t>11/29/2021</a:t>
+              <a:t>11/30/2021</a:t>
             </a:fld>
             <a:endParaRPr lang="en-US" dirty="0"/>
           </a:p>
@@ -4742,7 +4743,7 @@
             <a:fld id="{B61BEF0D-F0BB-DE4B-95CE-6DB70DBA9567}" type="datetimeFigureOut">
               <a:rPr lang="en-US" dirty="0"/>
               <a:pPr/>
-              <a:t>11/29/2021</a:t>
+              <a:t>11/30/2021</a:t>
             </a:fld>
             <a:endParaRPr lang="en-US" dirty="0"/>
           </a:p>
@@ -5063,7 +5064,7 @@
             <a:fld id="{B61BEF0D-F0BB-DE4B-95CE-6DB70DBA9567}" type="datetimeFigureOut">
               <a:rPr lang="en-US" dirty="0"/>
               <a:pPr/>
-              <a:t>11/29/2021</a:t>
+              <a:t>11/30/2021</a:t>
             </a:fld>
             <a:endParaRPr lang="en-US" dirty="0"/>
           </a:p>
@@ -5274,7 +5275,7 @@
             <a:fld id="{B61BEF0D-F0BB-DE4B-95CE-6DB70DBA9567}" type="datetimeFigureOut">
               <a:rPr lang="en-US" dirty="0"/>
               <a:pPr/>
-              <a:t>11/29/2021</a:t>
+              <a:t>11/30/2021</a:t>
             </a:fld>
             <a:endParaRPr lang="en-US" dirty="0"/>
           </a:p>
@@ -5869,6 +5870,93 @@
           <a:chExt cx="0" cy="0"/>
         </a:xfrm>
       </p:grpSpPr>
+      <p:sp>
+        <p:nvSpPr>
+          <p:cNvPr id="2" name="Title 1">
+            <a:extLst>
+              <a:ext uri="{FF2B5EF4-FFF2-40B4-BE49-F238E27FC236}">
+                <a16:creationId xmlns:a16="http://schemas.microsoft.com/office/drawing/2014/main" id="{33EA348F-FBD2-4858-B6FF-8A000B3A0489}"/>
+              </a:ext>
+            </a:extLst>
+          </p:cNvPr>
+          <p:cNvSpPr>
+            <a:spLocks noGrp="1"/>
+          </p:cNvSpPr>
+          <p:nvPr>
+            <p:ph type="title"/>
+          </p:nvPr>
+        </p:nvSpPr>
+        <p:spPr/>
+        <p:txBody>
+          <a:bodyPr/>
+          <a:lstStyle/>
+          <a:p>
+            <a:r>
+              <a:rPr lang="en-US" dirty="0"/>
+              <a:t>UML</a:t>
+            </a:r>
+          </a:p>
+        </p:txBody>
+      </p:sp>
+      <p:pic>
+        <p:nvPicPr>
+          <p:cNvPr id="5" name="Content Placeholder 4">
+            <a:extLst>
+              <a:ext uri="{FF2B5EF4-FFF2-40B4-BE49-F238E27FC236}">
+                <a16:creationId xmlns:a16="http://schemas.microsoft.com/office/drawing/2014/main" id="{E150FB0F-3822-43D1-BAB4-8176FC16637D}"/>
+              </a:ext>
+            </a:extLst>
+          </p:cNvPr>
+          <p:cNvPicPr>
+            <a:picLocks noGrp="1" noChangeAspect="1"/>
+          </p:cNvPicPr>
+          <p:nvPr>
+            <p:ph idx="1"/>
+          </p:nvPr>
+        </p:nvPicPr>
+        <p:blipFill>
+          <a:blip r:embed="rId2"/>
+          <a:stretch>
+            <a:fillRect/>
+          </a:stretch>
+        </p:blipFill>
+        <p:spPr>
+          <a:xfrm>
+            <a:off x="914102" y="2065867"/>
+            <a:ext cx="10363796" cy="4103217"/>
+          </a:xfrm>
+        </p:spPr>
+      </p:pic>
+    </p:spTree>
+    <p:extLst>
+      <p:ext uri="{BB962C8B-B14F-4D97-AF65-F5344CB8AC3E}">
+        <p14:creationId xmlns:p14="http://schemas.microsoft.com/office/powerpoint/2010/main" val="2327009108"/>
+      </p:ext>
+    </p:extLst>
+  </p:cSld>
+  <p:clrMapOvr>
+    <a:masterClrMapping/>
+  </p:clrMapOvr>
+</p:sld>
+</file>
+
+<file path=ppt/slides/slide11.xml><?xml version="1.0" encoding="utf-8"?>
+<p:sld xmlns:a="http://schemas.openxmlformats.org/drawingml/2006/main" xmlns:r="http://schemas.openxmlformats.org/officeDocument/2006/relationships" xmlns:p="http://schemas.openxmlformats.org/presentationml/2006/main">
+  <p:cSld>
+    <p:spTree>
+      <p:nvGrpSpPr>
+        <p:cNvPr id="1" name=""/>
+        <p:cNvGrpSpPr/>
+        <p:nvPr/>
+      </p:nvGrpSpPr>
+      <p:grpSpPr>
+        <a:xfrm>
+          <a:off x="0" y="0"/>
+          <a:ext cx="0" cy="0"/>
+          <a:chOff x="0" y="0"/>
+          <a:chExt cx="0" cy="0"/>
+        </a:xfrm>
+      </p:grpSpPr>
       <p:pic>
         <p:nvPicPr>
           <p:cNvPr id="7" name="Picture 6">
@@ -5934,6 +6022,92 @@
           <p:cNvPr id="2" name="Title 1">
             <a:extLst>
               <a:ext uri="{FF2B5EF4-FFF2-40B4-BE49-F238E27FC236}">
+                <a16:creationId xmlns:a16="http://schemas.microsoft.com/office/drawing/2014/main" id="{44935247-AEE4-426A-B145-694CEDB7CD24}"/>
+              </a:ext>
+            </a:extLst>
+          </p:cNvPr>
+          <p:cNvSpPr>
+            <a:spLocks noGrp="1"/>
+          </p:cNvSpPr>
+          <p:nvPr>
+            <p:ph type="title"/>
+          </p:nvPr>
+        </p:nvSpPr>
+        <p:spPr/>
+        <p:txBody>
+          <a:bodyPr/>
+          <a:lstStyle/>
+          <a:p>
+            <a:r>
+              <a:rPr lang="en-US" dirty="0"/>
+              <a:t>The Problem</a:t>
+            </a:r>
+          </a:p>
+        </p:txBody>
+      </p:sp>
+      <p:sp>
+        <p:nvSpPr>
+          <p:cNvPr id="3" name="Content Placeholder 2">
+            <a:extLst>
+              <a:ext uri="{FF2B5EF4-FFF2-40B4-BE49-F238E27FC236}">
+                <a16:creationId xmlns:a16="http://schemas.microsoft.com/office/drawing/2014/main" id="{64453B4A-BDFB-4434-BECF-CDA3E62F1556}"/>
+              </a:ext>
+            </a:extLst>
+          </p:cNvPr>
+          <p:cNvSpPr>
+            <a:spLocks noGrp="1"/>
+          </p:cNvSpPr>
+          <p:nvPr>
+            <p:ph idx="1"/>
+          </p:nvPr>
+        </p:nvSpPr>
+        <p:spPr/>
+        <p:txBody>
+          <a:bodyPr/>
+          <a:lstStyle/>
+          <a:p>
+            <a:r>
+              <a:rPr lang="en-US" dirty="0"/>
+              <a:t>Consider five philosophers who spend their lives thinking and eating. The philosophers share a circular table surrounded by five chairs, each belonging to one philosopher. In the center of the table is a bowl of rice, and the table is laid with five single chopsticks. When a philosopher thinks, she does not interact with her colleagues. From time to time, a philosopher gets hungry and tries to pick up the two chopsticks that are closest to her (the chopsticks that are between her and her left and right neighbors). A philosopher may pick up only one chopstick at a time. Obviously, she cannot pick up a chopstick that is already in the hand of a neighbor. When a hungry philosopher has both her chopsticks at the same time, she eats without releasing the chopsticks. When she is finished eating, she puts down both chopsticks and starts thinking again. </a:t>
+            </a:r>
+          </a:p>
+        </p:txBody>
+      </p:sp>
+    </p:spTree>
+    <p:extLst>
+      <p:ext uri="{BB962C8B-B14F-4D97-AF65-F5344CB8AC3E}">
+        <p14:creationId xmlns:p14="http://schemas.microsoft.com/office/powerpoint/2010/main" val="312215877"/>
+      </p:ext>
+    </p:extLst>
+  </p:cSld>
+  <p:clrMapOvr>
+    <a:masterClrMapping/>
+  </p:clrMapOvr>
+</p:sld>
+</file>
+
+<file path=ppt/slides/slide3.xml><?xml version="1.0" encoding="utf-8"?>
+<p:sld xmlns:a="http://schemas.openxmlformats.org/drawingml/2006/main" xmlns:r="http://schemas.openxmlformats.org/officeDocument/2006/relationships" xmlns:p="http://schemas.openxmlformats.org/presentationml/2006/main">
+  <p:cSld>
+    <p:spTree>
+      <p:nvGrpSpPr>
+        <p:cNvPr id="1" name=""/>
+        <p:cNvGrpSpPr/>
+        <p:nvPr/>
+      </p:nvGrpSpPr>
+      <p:grpSpPr>
+        <a:xfrm>
+          <a:off x="0" y="0"/>
+          <a:ext cx="0" cy="0"/>
+          <a:chOff x="0" y="0"/>
+          <a:chExt cx="0" cy="0"/>
+        </a:xfrm>
+      </p:grpSpPr>
+      <p:sp>
+        <p:nvSpPr>
+          <p:cNvPr id="2" name="Title 1">
+            <a:extLst>
+              <a:ext uri="{FF2B5EF4-FFF2-40B4-BE49-F238E27FC236}">
                 <a16:creationId xmlns:a16="http://schemas.microsoft.com/office/drawing/2014/main" id="{33EA348F-FBD2-4858-B6FF-8A000B3A0489}"/>
               </a:ext>
             </a:extLst>
@@ -5995,7 +6169,90 @@
 </p:sld>
 </file>
 
-<file path=ppt/slides/slide3.xml><?xml version="1.0" encoding="utf-8"?>
+<file path=ppt/slides/slide4.xml><?xml version="1.0" encoding="utf-8"?>
+<p:sld xmlns:a="http://schemas.openxmlformats.org/drawingml/2006/main" xmlns:r="http://schemas.openxmlformats.org/officeDocument/2006/relationships" xmlns:p="http://schemas.openxmlformats.org/presentationml/2006/main">
+  <p:cSld>
+    <p:spTree>
+      <p:nvGrpSpPr>
+        <p:cNvPr id="1" name=""/>
+        <p:cNvGrpSpPr/>
+        <p:nvPr/>
+      </p:nvGrpSpPr>
+      <p:grpSpPr>
+        <a:xfrm>
+          <a:off x="0" y="0"/>
+          <a:ext cx="0" cy="0"/>
+          <a:chOff x="0" y="0"/>
+          <a:chExt cx="0" cy="0"/>
+        </a:xfrm>
+      </p:grpSpPr>
+      <p:sp>
+        <p:nvSpPr>
+          <p:cNvPr id="2" name="Title 1">
+            <a:extLst>
+              <a:ext uri="{FF2B5EF4-FFF2-40B4-BE49-F238E27FC236}">
+                <a16:creationId xmlns:a16="http://schemas.microsoft.com/office/drawing/2014/main" id="{33EA348F-FBD2-4858-B6FF-8A000B3A0489}"/>
+              </a:ext>
+            </a:extLst>
+          </p:cNvPr>
+          <p:cNvSpPr>
+            <a:spLocks noGrp="1"/>
+          </p:cNvSpPr>
+          <p:nvPr>
+            <p:ph type="title"/>
+          </p:nvPr>
+        </p:nvSpPr>
+        <p:spPr/>
+        <p:txBody>
+          <a:bodyPr/>
+          <a:lstStyle/>
+          <a:p>
+            <a:r>
+              <a:rPr lang="en-US" dirty="0"/>
+              <a:t>Challenges faced</a:t>
+            </a:r>
+          </a:p>
+        </p:txBody>
+      </p:sp>
+      <p:sp>
+        <p:nvSpPr>
+          <p:cNvPr id="3" name="Content Placeholder 2">
+            <a:extLst>
+              <a:ext uri="{FF2B5EF4-FFF2-40B4-BE49-F238E27FC236}">
+                <a16:creationId xmlns:a16="http://schemas.microsoft.com/office/drawing/2014/main" id="{87379F3D-0D31-4CEA-8AEC-F34CEEFB841C}"/>
+              </a:ext>
+            </a:extLst>
+          </p:cNvPr>
+          <p:cNvSpPr>
+            <a:spLocks noGrp="1"/>
+          </p:cNvSpPr>
+          <p:nvPr>
+            <p:ph idx="1"/>
+          </p:nvPr>
+        </p:nvSpPr>
+        <p:spPr/>
+        <p:txBody>
+          <a:bodyPr/>
+          <a:lstStyle/>
+          <a:p>
+            <a:endParaRPr lang="en-US"/>
+          </a:p>
+        </p:txBody>
+      </p:sp>
+    </p:spTree>
+    <p:extLst>
+      <p:ext uri="{BB962C8B-B14F-4D97-AF65-F5344CB8AC3E}">
+        <p14:creationId xmlns:p14="http://schemas.microsoft.com/office/powerpoint/2010/main" val="76325399"/>
+      </p:ext>
+    </p:extLst>
+  </p:cSld>
+  <p:clrMapOvr>
+    <a:masterClrMapping/>
+  </p:clrMapOvr>
+</p:sld>
+</file>
+
+<file path=ppt/slides/slide5.xml><?xml version="1.0" encoding="utf-8"?>
 <p:sld xmlns:a="http://schemas.openxmlformats.org/drawingml/2006/main" xmlns:r="http://schemas.openxmlformats.org/officeDocument/2006/relationships" xmlns:p="http://schemas.openxmlformats.org/presentationml/2006/main">
   <p:cSld>
     <p:spTree>
@@ -6082,172 +6339,6 @@
 </p:sld>
 </file>
 
-<file path=ppt/slides/slide4.xml><?xml version="1.0" encoding="utf-8"?>
-<p:sld xmlns:a="http://schemas.openxmlformats.org/drawingml/2006/main" xmlns:r="http://schemas.openxmlformats.org/officeDocument/2006/relationships" xmlns:p="http://schemas.openxmlformats.org/presentationml/2006/main">
-  <p:cSld>
-    <p:spTree>
-      <p:nvGrpSpPr>
-        <p:cNvPr id="1" name=""/>
-        <p:cNvGrpSpPr/>
-        <p:nvPr/>
-      </p:nvGrpSpPr>
-      <p:grpSpPr>
-        <a:xfrm>
-          <a:off x="0" y="0"/>
-          <a:ext cx="0" cy="0"/>
-          <a:chOff x="0" y="0"/>
-          <a:chExt cx="0" cy="0"/>
-        </a:xfrm>
-      </p:grpSpPr>
-      <p:sp>
-        <p:nvSpPr>
-          <p:cNvPr id="2" name="Title 1">
-            <a:extLst>
-              <a:ext uri="{FF2B5EF4-FFF2-40B4-BE49-F238E27FC236}">
-                <a16:creationId xmlns:a16="http://schemas.microsoft.com/office/drawing/2014/main" id="{33EA348F-FBD2-4858-B6FF-8A000B3A0489}"/>
-              </a:ext>
-            </a:extLst>
-          </p:cNvPr>
-          <p:cNvSpPr>
-            <a:spLocks noGrp="1"/>
-          </p:cNvSpPr>
-          <p:nvPr>
-            <p:ph type="title"/>
-          </p:nvPr>
-        </p:nvSpPr>
-        <p:spPr/>
-        <p:txBody>
-          <a:bodyPr/>
-          <a:lstStyle/>
-          <a:p>
-            <a:r>
-              <a:rPr lang="en-US" dirty="0"/>
-              <a:t>Main Method Explained</a:t>
-            </a:r>
-          </a:p>
-        </p:txBody>
-      </p:sp>
-      <p:sp>
-        <p:nvSpPr>
-          <p:cNvPr id="3" name="Content Placeholder 2">
-            <a:extLst>
-              <a:ext uri="{FF2B5EF4-FFF2-40B4-BE49-F238E27FC236}">
-                <a16:creationId xmlns:a16="http://schemas.microsoft.com/office/drawing/2014/main" id="{87379F3D-0D31-4CEA-8AEC-F34CEEFB841C}"/>
-              </a:ext>
-            </a:extLst>
-          </p:cNvPr>
-          <p:cNvSpPr>
-            <a:spLocks noGrp="1"/>
-          </p:cNvSpPr>
-          <p:nvPr>
-            <p:ph idx="1"/>
-          </p:nvPr>
-        </p:nvSpPr>
-        <p:spPr/>
-        <p:txBody>
-          <a:bodyPr/>
-          <a:lstStyle/>
-          <a:p>
-            <a:endParaRPr lang="en-US"/>
-          </a:p>
-        </p:txBody>
-      </p:sp>
-    </p:spTree>
-    <p:extLst>
-      <p:ext uri="{BB962C8B-B14F-4D97-AF65-F5344CB8AC3E}">
-        <p14:creationId xmlns:p14="http://schemas.microsoft.com/office/powerpoint/2010/main" val="2383972380"/>
-      </p:ext>
-    </p:extLst>
-  </p:cSld>
-  <p:clrMapOvr>
-    <a:masterClrMapping/>
-  </p:clrMapOvr>
-</p:sld>
-</file>
-
-<file path=ppt/slides/slide5.xml><?xml version="1.0" encoding="utf-8"?>
-<p:sld xmlns:a="http://schemas.openxmlformats.org/drawingml/2006/main" xmlns:r="http://schemas.openxmlformats.org/officeDocument/2006/relationships" xmlns:p="http://schemas.openxmlformats.org/presentationml/2006/main">
-  <p:cSld>
-    <p:spTree>
-      <p:nvGrpSpPr>
-        <p:cNvPr id="1" name=""/>
-        <p:cNvGrpSpPr/>
-        <p:nvPr/>
-      </p:nvGrpSpPr>
-      <p:grpSpPr>
-        <a:xfrm>
-          <a:off x="0" y="0"/>
-          <a:ext cx="0" cy="0"/>
-          <a:chOff x="0" y="0"/>
-          <a:chExt cx="0" cy="0"/>
-        </a:xfrm>
-      </p:grpSpPr>
-      <p:sp>
-        <p:nvSpPr>
-          <p:cNvPr id="2" name="Title 1">
-            <a:extLst>
-              <a:ext uri="{FF2B5EF4-FFF2-40B4-BE49-F238E27FC236}">
-                <a16:creationId xmlns:a16="http://schemas.microsoft.com/office/drawing/2014/main" id="{33EA348F-FBD2-4858-B6FF-8A000B3A0489}"/>
-              </a:ext>
-            </a:extLst>
-          </p:cNvPr>
-          <p:cNvSpPr>
-            <a:spLocks noGrp="1"/>
-          </p:cNvSpPr>
-          <p:nvPr>
-            <p:ph type="title"/>
-          </p:nvPr>
-        </p:nvSpPr>
-        <p:spPr/>
-        <p:txBody>
-          <a:bodyPr/>
-          <a:lstStyle/>
-          <a:p>
-            <a:r>
-              <a:rPr lang="en-US" dirty="0"/>
-              <a:t>Philosopher Class</a:t>
-            </a:r>
-          </a:p>
-        </p:txBody>
-      </p:sp>
-      <p:sp>
-        <p:nvSpPr>
-          <p:cNvPr id="3" name="Content Placeholder 2">
-            <a:extLst>
-              <a:ext uri="{FF2B5EF4-FFF2-40B4-BE49-F238E27FC236}">
-                <a16:creationId xmlns:a16="http://schemas.microsoft.com/office/drawing/2014/main" id="{87379F3D-0D31-4CEA-8AEC-F34CEEFB841C}"/>
-              </a:ext>
-            </a:extLst>
-          </p:cNvPr>
-          <p:cNvSpPr>
-            <a:spLocks noGrp="1"/>
-          </p:cNvSpPr>
-          <p:nvPr>
-            <p:ph idx="1"/>
-          </p:nvPr>
-        </p:nvSpPr>
-        <p:spPr/>
-        <p:txBody>
-          <a:bodyPr/>
-          <a:lstStyle/>
-          <a:p>
-            <a:endParaRPr lang="en-US"/>
-          </a:p>
-        </p:txBody>
-      </p:sp>
-    </p:spTree>
-    <p:extLst>
-      <p:ext uri="{BB962C8B-B14F-4D97-AF65-F5344CB8AC3E}">
-        <p14:creationId xmlns:p14="http://schemas.microsoft.com/office/powerpoint/2010/main" val="747123852"/>
-      </p:ext>
-    </p:extLst>
-  </p:cSld>
-  <p:clrMapOvr>
-    <a:masterClrMapping/>
-  </p:clrMapOvr>
-</p:sld>
-</file>
-
 <file path=ppt/slides/slide6.xml><?xml version="1.0" encoding="utf-8"?>
 <p:sld xmlns:a="http://schemas.openxmlformats.org/drawingml/2006/main" xmlns:r="http://schemas.openxmlformats.org/officeDocument/2006/relationships" xmlns:p="http://schemas.openxmlformats.org/presentationml/2006/main">
   <p:cSld>
@@ -6288,7 +6379,7 @@
           <a:p>
             <a:r>
               <a:rPr lang="en-US" dirty="0"/>
-              <a:t>Philosopher Class explained</a:t>
+              <a:t>Main Method Explained</a:t>
             </a:r>
           </a:p>
         </p:txBody>
@@ -6314,14 +6405,35 @@
           <a:bodyPr/>
           <a:lstStyle/>
           <a:p>
-            <a:endParaRPr lang="en-US"/>
+            <a:r>
+              <a:rPr lang="en-US" dirty="0"/>
+              <a:t>Runs Everything </a:t>
+            </a:r>
+          </a:p>
+          <a:p>
+            <a:r>
+              <a:rPr lang="en-US" dirty="0"/>
+              <a:t>Starts the Philosophers </a:t>
+            </a:r>
+          </a:p>
+          <a:p>
+            <a:r>
+              <a:rPr lang="en-US" dirty="0"/>
+              <a:t>Creates the sticks</a:t>
+            </a:r>
+          </a:p>
+          <a:p>
+            <a:r>
+              <a:rPr lang="en-US" dirty="0"/>
+              <a:t>Assigns the sticks </a:t>
+            </a:r>
           </a:p>
         </p:txBody>
       </p:sp>
     </p:spTree>
     <p:extLst>
       <p:ext uri="{BB962C8B-B14F-4D97-AF65-F5344CB8AC3E}">
-        <p14:creationId xmlns:p14="http://schemas.microsoft.com/office/powerpoint/2010/main" val="2962842195"/>
+        <p14:creationId xmlns:p14="http://schemas.microsoft.com/office/powerpoint/2010/main" val="2383972380"/>
       </p:ext>
     </p:extLst>
   </p:cSld>
@@ -6371,40 +6483,105 @@
           <a:p>
             <a:r>
               <a:rPr lang="en-US" dirty="0"/>
-              <a:t>Philosopher class - run</a:t>
-            </a:r>
-          </a:p>
-        </p:txBody>
-      </p:sp>
-      <p:sp>
-        <p:nvSpPr>
-          <p:cNvPr id="3" name="Content Placeholder 2">
+              <a:t>Philosopher Class</a:t>
+            </a:r>
+          </a:p>
+        </p:txBody>
+      </p:sp>
+      <p:pic>
+        <p:nvPicPr>
+          <p:cNvPr id="5" name="Picture 4">
             <a:extLst>
               <a:ext uri="{FF2B5EF4-FFF2-40B4-BE49-F238E27FC236}">
-                <a16:creationId xmlns:a16="http://schemas.microsoft.com/office/drawing/2014/main" id="{87379F3D-0D31-4CEA-8AEC-F34CEEFB841C}"/>
+                <a16:creationId xmlns:a16="http://schemas.microsoft.com/office/drawing/2014/main" id="{A70D44F8-F11C-450C-916A-D8088803A7E2}"/>
               </a:ext>
             </a:extLst>
           </p:cNvPr>
-          <p:cNvSpPr>
-            <a:spLocks noGrp="1"/>
-          </p:cNvSpPr>
-          <p:nvPr>
-            <p:ph idx="1"/>
-          </p:nvPr>
-        </p:nvSpPr>
-        <p:spPr/>
-        <p:txBody>
-          <a:bodyPr/>
-          <a:lstStyle/>
-          <a:p>
-            <a:endParaRPr lang="en-US"/>
-          </a:p>
-        </p:txBody>
-      </p:sp>
+          <p:cNvPicPr>
+            <a:picLocks noChangeAspect="1"/>
+          </p:cNvPicPr>
+          <p:nvPr/>
+        </p:nvPicPr>
+        <p:blipFill>
+          <a:blip r:embed="rId2"/>
+          <a:stretch>
+            <a:fillRect/>
+          </a:stretch>
+        </p:blipFill>
+        <p:spPr>
+          <a:xfrm>
+            <a:off x="8128639" y="1835573"/>
+            <a:ext cx="3472796" cy="3745830"/>
+          </a:xfrm>
+          <a:prstGeom prst="rect">
+            <a:avLst/>
+          </a:prstGeom>
+        </p:spPr>
+      </p:pic>
+      <p:pic>
+        <p:nvPicPr>
+          <p:cNvPr id="7" name="Picture 6">
+            <a:extLst>
+              <a:ext uri="{FF2B5EF4-FFF2-40B4-BE49-F238E27FC236}">
+                <a16:creationId xmlns:a16="http://schemas.microsoft.com/office/drawing/2014/main" id="{BE4657A5-5B68-4DB5-A938-0A3C52A069F7}"/>
+              </a:ext>
+            </a:extLst>
+          </p:cNvPr>
+          <p:cNvPicPr>
+            <a:picLocks noChangeAspect="1"/>
+          </p:cNvPicPr>
+          <p:nvPr/>
+        </p:nvPicPr>
+        <p:blipFill>
+          <a:blip r:embed="rId3"/>
+          <a:stretch>
+            <a:fillRect/>
+          </a:stretch>
+        </p:blipFill>
+        <p:spPr>
+          <a:xfrm>
+            <a:off x="685801" y="1835573"/>
+            <a:ext cx="3377560" cy="3745830"/>
+          </a:xfrm>
+          <a:prstGeom prst="rect">
+            <a:avLst/>
+          </a:prstGeom>
+        </p:spPr>
+      </p:pic>
+      <p:pic>
+        <p:nvPicPr>
+          <p:cNvPr id="9" name="Picture 8">
+            <a:extLst>
+              <a:ext uri="{FF2B5EF4-FFF2-40B4-BE49-F238E27FC236}">
+                <a16:creationId xmlns:a16="http://schemas.microsoft.com/office/drawing/2014/main" id="{FA95E79F-42CD-491C-BBCC-B95CF6F8D3D1}"/>
+              </a:ext>
+            </a:extLst>
+          </p:cNvPr>
+          <p:cNvPicPr>
+            <a:picLocks noChangeAspect="1"/>
+          </p:cNvPicPr>
+          <p:nvPr/>
+        </p:nvPicPr>
+        <p:blipFill>
+          <a:blip r:embed="rId4"/>
+          <a:stretch>
+            <a:fillRect/>
+          </a:stretch>
+        </p:blipFill>
+        <p:spPr>
+          <a:xfrm>
+            <a:off x="4359602" y="1835573"/>
+            <a:ext cx="3472796" cy="2553190"/>
+          </a:xfrm>
+          <a:prstGeom prst="rect">
+            <a:avLst/>
+          </a:prstGeom>
+        </p:spPr>
+      </p:pic>
     </p:spTree>
     <p:extLst>
       <p:ext uri="{BB962C8B-B14F-4D97-AF65-F5344CB8AC3E}">
-        <p14:creationId xmlns:p14="http://schemas.microsoft.com/office/powerpoint/2010/main" val="1100539259"/>
+        <p14:creationId xmlns:p14="http://schemas.microsoft.com/office/powerpoint/2010/main" val="747123852"/>
       </p:ext>
     </p:extLst>
   </p:cSld>
@@ -6454,7 +6631,7 @@
           <a:p>
             <a:r>
               <a:rPr lang="en-US" dirty="0"/>
-              <a:t>Challenges faced</a:t>
+              <a:t>Philosopher Class explained</a:t>
             </a:r>
           </a:p>
         </p:txBody>
@@ -6480,14 +6657,32 @@
           <a:bodyPr/>
           <a:lstStyle/>
           <a:p>
-            <a:endParaRPr lang="en-US"/>
+            <a:r>
+              <a:rPr lang="en-US" dirty="0"/>
+              <a:t>Creates the Philosophers </a:t>
+            </a:r>
+          </a:p>
+          <a:p>
+            <a:r>
+              <a:rPr lang="en-US" dirty="0"/>
+              <a:t>Creates the Sticks </a:t>
+            </a:r>
+          </a:p>
+          <a:p>
+            <a:r>
+              <a:rPr lang="en-US" dirty="0"/>
+              <a:t>Sets states for philosopher </a:t>
+            </a:r>
+          </a:p>
+          <a:p>
+            <a:endParaRPr lang="en-US" dirty="0"/>
           </a:p>
         </p:txBody>
       </p:sp>
     </p:spTree>
     <p:extLst>
       <p:ext uri="{BB962C8B-B14F-4D97-AF65-F5344CB8AC3E}">
-        <p14:creationId xmlns:p14="http://schemas.microsoft.com/office/powerpoint/2010/main" val="76325399"/>
+        <p14:creationId xmlns:p14="http://schemas.microsoft.com/office/powerpoint/2010/main" val="2962842195"/>
       </p:ext>
     </p:extLst>
   </p:cSld>
@@ -6537,26 +6732,54 @@
           <a:p>
             <a:r>
               <a:rPr lang="en-US" dirty="0"/>
-              <a:t>UML</a:t>
-            </a:r>
+              <a:t>Philosopher class - run</a:t>
+            </a:r>
+          </a:p>
+        </p:txBody>
+      </p:sp>
+      <p:sp>
+        <p:nvSpPr>
+          <p:cNvPr id="3" name="Content Placeholder 2">
+            <a:extLst>
+              <a:ext uri="{FF2B5EF4-FFF2-40B4-BE49-F238E27FC236}">
+                <a16:creationId xmlns:a16="http://schemas.microsoft.com/office/drawing/2014/main" id="{87379F3D-0D31-4CEA-8AEC-F34CEEFB841C}"/>
+              </a:ext>
+            </a:extLst>
+          </p:cNvPr>
+          <p:cNvSpPr>
+            <a:spLocks noGrp="1"/>
+          </p:cNvSpPr>
+          <p:nvPr>
+            <p:ph idx="1"/>
+          </p:nvPr>
+        </p:nvSpPr>
+        <p:spPr>
+          <a:xfrm>
+            <a:off x="685802" y="2142067"/>
+            <a:ext cx="4713926" cy="3649133"/>
+          </a:xfrm>
+        </p:spPr>
+        <p:txBody>
+          <a:bodyPr/>
+          <a:lstStyle/>
+          <a:p>
+            <a:endParaRPr lang="en-US" dirty="0"/>
           </a:p>
         </p:txBody>
       </p:sp>
       <p:pic>
         <p:nvPicPr>
-          <p:cNvPr id="5" name="Content Placeholder 4">
+          <p:cNvPr id="5" name="Picture 4">
             <a:extLst>
               <a:ext uri="{FF2B5EF4-FFF2-40B4-BE49-F238E27FC236}">
-                <a16:creationId xmlns:a16="http://schemas.microsoft.com/office/drawing/2014/main" id="{E150FB0F-3822-43D1-BAB4-8176FC16637D}"/>
+                <a16:creationId xmlns:a16="http://schemas.microsoft.com/office/drawing/2014/main" id="{110D6B1A-3660-48FD-9963-5E9563E51F80}"/>
               </a:ext>
             </a:extLst>
           </p:cNvPr>
           <p:cNvPicPr>
-            <a:picLocks noGrp="1" noChangeAspect="1"/>
+            <a:picLocks noChangeAspect="1"/>
           </p:cNvPicPr>
-          <p:nvPr>
-            <p:ph idx="1"/>
-          </p:nvPr>
+          <p:nvPr/>
         </p:nvPicPr>
         <p:blipFill>
           <a:blip r:embed="rId2"/>
@@ -6566,15 +6789,18 @@
         </p:blipFill>
         <p:spPr>
           <a:xfrm>
-            <a:off x="914102" y="2065867"/>
-            <a:ext cx="10363796" cy="4103217"/>
+            <a:off x="5399727" y="1742446"/>
+            <a:ext cx="6792273" cy="4505954"/>
           </a:xfrm>
+          <a:prstGeom prst="rect">
+            <a:avLst/>
+          </a:prstGeom>
         </p:spPr>
       </p:pic>
     </p:spTree>
     <p:extLst>
       <p:ext uri="{BB962C8B-B14F-4D97-AF65-F5344CB8AC3E}">
-        <p14:creationId xmlns:p14="http://schemas.microsoft.com/office/powerpoint/2010/main" val="2327009108"/>
+        <p14:creationId xmlns:p14="http://schemas.microsoft.com/office/powerpoint/2010/main" val="1100539259"/>
       </p:ext>
     </p:extLst>
   </p:cSld>

</xml_diff>